<commit_message>
Added to presentation some slides
</commit_message>
<xml_diff>
--- a/PAva_Presentation.pptx
+++ b/PAva_Presentation.pptx
@@ -7,8 +7,9 @@
   <p:sldIdLst>
     <p:sldId id="256" r:id="rId2"/>
     <p:sldId id="257" r:id="rId3"/>
-    <p:sldId id="258" r:id="rId4"/>
-    <p:sldId id="259" r:id="rId5"/>
+    <p:sldId id="260" r:id="rId4"/>
+    <p:sldId id="258" r:id="rId5"/>
+    <p:sldId id="262" r:id="rId6"/>
   </p:sldIdLst>
   <p:sldSz cx="12192000" cy="6858000"/>
   <p:notesSz cx="6858000" cy="9144000"/>
@@ -107,6 +108,11 @@
       </a:defRPr>
     </a:lvl9pPr>
   </p:defaultTextStyle>
+  <p:extLst>
+    <p:ext uri="{EFAFB233-063F-42B5-8137-9DF3F51BA10A}">
+      <p15:sldGuideLst xmlns:p15="http://schemas.microsoft.com/office/powerpoint/2012/main"/>
+    </p:ext>
+  </p:extLst>
 </p:presentation>
 </file>
 
@@ -296,7 +302,7 @@
           <a:p>
             <a:fld id="{02A23440-DF71-B34C-8C08-1052DE92B546}" type="datetimeFigureOut">
               <a:rPr lang="en-PT" smtClean="0"/>
-              <a:t>16/05/2020</a:t>
+              <a:t>05/19/2020</a:t>
             </a:fld>
             <a:endParaRPr lang="en-PT"/>
           </a:p>
@@ -571,7 +577,7 @@
           <a:p>
             <a:fld id="{02A23440-DF71-B34C-8C08-1052DE92B546}" type="datetimeFigureOut">
               <a:rPr lang="en-PT" smtClean="0"/>
-              <a:t>16/05/2020</a:t>
+              <a:t>05/19/2020</a:t>
             </a:fld>
             <a:endParaRPr lang="en-PT"/>
           </a:p>
@@ -765,7 +771,7 @@
           <a:p>
             <a:fld id="{02A23440-DF71-B34C-8C08-1052DE92B546}" type="datetimeFigureOut">
               <a:rPr lang="en-PT" smtClean="0"/>
-              <a:t>16/05/2020</a:t>
+              <a:t>05/19/2020</a:t>
             </a:fld>
             <a:endParaRPr lang="en-PT"/>
           </a:p>
@@ -1038,7 +1044,7 @@
           <a:p>
             <a:fld id="{02A23440-DF71-B34C-8C08-1052DE92B546}" type="datetimeFigureOut">
               <a:rPr lang="en-PT" smtClean="0"/>
-              <a:t>16/05/2020</a:t>
+              <a:t>05/19/2020</a:t>
             </a:fld>
             <a:endParaRPr lang="en-PT"/>
           </a:p>
@@ -1379,7 +1385,7 @@
           <a:p>
             <a:fld id="{02A23440-DF71-B34C-8C08-1052DE92B546}" type="datetimeFigureOut">
               <a:rPr lang="en-PT" smtClean="0"/>
-              <a:t>16/05/2020</a:t>
+              <a:t>05/19/2020</a:t>
             </a:fld>
             <a:endParaRPr lang="en-PT"/>
           </a:p>
@@ -2002,7 +2008,7 @@
           <a:p>
             <a:fld id="{02A23440-DF71-B34C-8C08-1052DE92B546}" type="datetimeFigureOut">
               <a:rPr lang="en-PT" smtClean="0"/>
-              <a:t>16/05/2020</a:t>
+              <a:t>05/19/2020</a:t>
             </a:fld>
             <a:endParaRPr lang="en-PT"/>
           </a:p>
@@ -2862,7 +2868,7 @@
           <a:p>
             <a:fld id="{02A23440-DF71-B34C-8C08-1052DE92B546}" type="datetimeFigureOut">
               <a:rPr lang="en-PT" smtClean="0"/>
-              <a:t>16/05/2020</a:t>
+              <a:t>05/19/2020</a:t>
             </a:fld>
             <a:endParaRPr lang="en-PT"/>
           </a:p>
@@ -3032,7 +3038,7 @@
           <a:p>
             <a:fld id="{02A23440-DF71-B34C-8C08-1052DE92B546}" type="datetimeFigureOut">
               <a:rPr lang="en-PT" smtClean="0"/>
-              <a:t>16/05/2020</a:t>
+              <a:t>05/19/2020</a:t>
             </a:fld>
             <a:endParaRPr lang="en-PT"/>
           </a:p>
@@ -3212,7 +3218,7 @@
           <a:p>
             <a:fld id="{02A23440-DF71-B34C-8C08-1052DE92B546}" type="datetimeFigureOut">
               <a:rPr lang="en-PT" smtClean="0"/>
-              <a:t>16/05/2020</a:t>
+              <a:t>05/19/2020</a:t>
             </a:fld>
             <a:endParaRPr lang="en-PT"/>
           </a:p>
@@ -3382,7 +3388,7 @@
           <a:p>
             <a:fld id="{02A23440-DF71-B34C-8C08-1052DE92B546}" type="datetimeFigureOut">
               <a:rPr lang="en-PT" smtClean="0"/>
-              <a:t>16/05/2020</a:t>
+              <a:t>05/19/2020</a:t>
             </a:fld>
             <a:endParaRPr lang="en-PT"/>
           </a:p>
@@ -3629,7 +3635,7 @@
           <a:p>
             <a:fld id="{02A23440-DF71-B34C-8C08-1052DE92B546}" type="datetimeFigureOut">
               <a:rPr lang="en-PT" smtClean="0"/>
-              <a:t>16/05/2020</a:t>
+              <a:t>05/19/2020</a:t>
             </a:fld>
             <a:endParaRPr lang="en-PT"/>
           </a:p>
@@ -3921,7 +3927,7 @@
           <a:p>
             <a:fld id="{02A23440-DF71-B34C-8C08-1052DE92B546}" type="datetimeFigureOut">
               <a:rPr lang="en-PT" smtClean="0"/>
-              <a:t>16/05/2020</a:t>
+              <a:t>05/19/2020</a:t>
             </a:fld>
             <a:endParaRPr lang="en-PT"/>
           </a:p>
@@ -4365,7 +4371,7 @@
           <a:p>
             <a:fld id="{02A23440-DF71-B34C-8C08-1052DE92B546}" type="datetimeFigureOut">
               <a:rPr lang="en-PT" smtClean="0"/>
-              <a:t>16/05/2020</a:t>
+              <a:t>05/19/2020</a:t>
             </a:fld>
             <a:endParaRPr lang="en-PT"/>
           </a:p>
@@ -4483,7 +4489,7 @@
           <a:p>
             <a:fld id="{02A23440-DF71-B34C-8C08-1052DE92B546}" type="datetimeFigureOut">
               <a:rPr lang="en-PT" smtClean="0"/>
-              <a:t>16/05/2020</a:t>
+              <a:t>05/19/2020</a:t>
             </a:fld>
             <a:endParaRPr lang="en-PT"/>
           </a:p>
@@ -4578,7 +4584,7 @@
           <a:p>
             <a:fld id="{02A23440-DF71-B34C-8C08-1052DE92B546}" type="datetimeFigureOut">
               <a:rPr lang="en-PT" smtClean="0"/>
-              <a:t>16/05/2020</a:t>
+              <a:t>05/19/2020</a:t>
             </a:fld>
             <a:endParaRPr lang="en-PT"/>
           </a:p>
@@ -4857,7 +4863,7 @@
           <a:p>
             <a:fld id="{02A23440-DF71-B34C-8C08-1052DE92B546}" type="datetimeFigureOut">
               <a:rPr lang="en-PT" smtClean="0"/>
-              <a:t>16/05/2020</a:t>
+              <a:t>05/19/2020</a:t>
             </a:fld>
             <a:endParaRPr lang="en-PT"/>
           </a:p>
@@ -5132,7 +5138,7 @@
           <a:p>
             <a:fld id="{02A23440-DF71-B34C-8C08-1052DE92B546}" type="datetimeFigureOut">
               <a:rPr lang="en-PT" smtClean="0"/>
-              <a:t>16/05/2020</a:t>
+              <a:t>05/19/2020</a:t>
             </a:fld>
             <a:endParaRPr lang="en-PT"/>
           </a:p>
@@ -5561,7 +5567,7 @@
           <a:p>
             <a:fld id="{02A23440-DF71-B34C-8C08-1052DE92B546}" type="datetimeFigureOut">
               <a:rPr lang="en-PT" smtClean="0"/>
-              <a:t>16/05/2020</a:t>
+              <a:t>05/19/2020</a:t>
             </a:fld>
             <a:endParaRPr lang="en-PT"/>
           </a:p>
@@ -6250,7 +6256,7 @@
               <a:rPr lang="en-GB" sz="3200" dirty="0">
                 <a:cs typeface="Calibri" panose="020F0502020204030204" pitchFamily="34" charset="0"/>
               </a:rPr>
-              <a:t>of the operations for the signalling and handling of exceptional situations in Julia </a:t>
+              <a:t>of the operations for the signalling and handling of exceptional situations in Julia</a:t>
             </a:r>
           </a:p>
           <a:p>
@@ -6296,6 +6302,133 @@
           <p:cNvPr id="2" name="Title 1">
             <a:extLst>
               <a:ext uri="{FF2B5EF4-FFF2-40B4-BE49-F238E27FC236}">
+                <a16:creationId xmlns:a16="http://schemas.microsoft.com/office/drawing/2014/main" id="{4AFF30BC-54FA-426D-B272-E364A11CA5C1}"/>
+              </a:ext>
+            </a:extLst>
+          </p:cNvPr>
+          <p:cNvSpPr>
+            <a:spLocks noGrp="1"/>
+          </p:cNvSpPr>
+          <p:nvPr>
+            <p:ph type="title"/>
+          </p:nvPr>
+        </p:nvSpPr>
+        <p:spPr/>
+        <p:txBody>
+          <a:bodyPr/>
+          <a:lstStyle/>
+          <a:p>
+            <a:r>
+              <a:rPr lang="pt-PT" dirty="0"/>
+              <a:t>Project’s Goal</a:t>
+            </a:r>
+          </a:p>
+        </p:txBody>
+      </p:sp>
+      <p:sp>
+        <p:nvSpPr>
+          <p:cNvPr id="3" name="Content Placeholder 2">
+            <a:extLst>
+              <a:ext uri="{FF2B5EF4-FFF2-40B4-BE49-F238E27FC236}">
+                <a16:creationId xmlns:a16="http://schemas.microsoft.com/office/drawing/2014/main" id="{9FF30D64-7323-4B26-84AB-1E4E77DDBFBA}"/>
+              </a:ext>
+            </a:extLst>
+          </p:cNvPr>
+          <p:cNvSpPr>
+            <a:spLocks noGrp="1"/>
+          </p:cNvSpPr>
+          <p:nvPr>
+            <p:ph idx="1"/>
+          </p:nvPr>
+        </p:nvSpPr>
+        <p:spPr/>
+        <p:txBody>
+          <a:bodyPr>
+            <a:normAutofit/>
+          </a:bodyPr>
+          <a:lstStyle/>
+          <a:p>
+            <a:pPr marL="0" indent="0">
+              <a:buNone/>
+            </a:pPr>
+            <a:r>
+              <a:rPr lang="pt-PT" dirty="0"/>
+              <a:t>The main aim is to implement exception handling that doesn’t jump out and lose scope like in try-catch.</a:t>
+            </a:r>
+          </a:p>
+          <a:p>
+            <a:pPr marL="0" indent="0">
+              <a:buNone/>
+            </a:pPr>
+            <a:endParaRPr lang="pt-PT" dirty="0"/>
+          </a:p>
+          <a:p>
+            <a:pPr marL="0" indent="0">
+              <a:buNone/>
+            </a:pPr>
+            <a:r>
+              <a:rPr lang="pt-PT" dirty="0"/>
+              <a:t>In a classic try-catch, once an exception is caught, the current execution jumps to the catch and local computation is lost and variables from outer scope that aren’t lost can be left in an incorrect / unfinished state. </a:t>
+            </a:r>
+          </a:p>
+          <a:p>
+            <a:pPr marL="0" indent="0">
+              <a:buNone/>
+            </a:pPr>
+            <a:endParaRPr lang="pt-PT" dirty="0"/>
+          </a:p>
+          <a:p>
+            <a:pPr marL="0" indent="0">
+              <a:buNone/>
+            </a:pPr>
+            <a:r>
+              <a:rPr lang="pt-PT" dirty="0"/>
+              <a:t>We implement some exception handling available in Common Lisp Condition System, handlers and restarts.</a:t>
+            </a:r>
+          </a:p>
+          <a:p>
+            <a:pPr marL="0" indent="0">
+              <a:buNone/>
+            </a:pPr>
+            <a:endParaRPr lang="pt-PT" dirty="0"/>
+          </a:p>
+        </p:txBody>
+      </p:sp>
+    </p:spTree>
+    <p:extLst>
+      <p:ext uri="{BB962C8B-B14F-4D97-AF65-F5344CB8AC3E}">
+        <p14:creationId xmlns:p14="http://schemas.microsoft.com/office/powerpoint/2010/main" val="3165469610"/>
+      </p:ext>
+    </p:extLst>
+  </p:cSld>
+  <p:clrMapOvr>
+    <a:masterClrMapping/>
+  </p:clrMapOvr>
+</p:sld>
+</file>
+
+<file path=ppt/slides/slide4.xml><?xml version="1.0" encoding="utf-8"?>
+<p:sld xmlns:a="http://schemas.openxmlformats.org/drawingml/2006/main" xmlns:r="http://schemas.openxmlformats.org/officeDocument/2006/relationships" xmlns:p="http://schemas.openxmlformats.org/presentationml/2006/main">
+  <p:cSld>
+    <p:spTree>
+      <p:nvGrpSpPr>
+        <p:cNvPr id="1" name=""/>
+        <p:cNvGrpSpPr/>
+        <p:nvPr/>
+      </p:nvGrpSpPr>
+      <p:grpSpPr>
+        <a:xfrm>
+          <a:off x="0" y="0"/>
+          <a:ext cx="0" cy="0"/>
+          <a:chOff x="0" y="0"/>
+          <a:chExt cx="0" cy="0"/>
+        </a:xfrm>
+      </p:grpSpPr>
+      <p:sp>
+        <p:nvSpPr>
+          <p:cNvPr id="2" name="Title 1">
+            <a:extLst>
+              <a:ext uri="{FF2B5EF4-FFF2-40B4-BE49-F238E27FC236}">
                 <a16:creationId xmlns:a16="http://schemas.microsoft.com/office/drawing/2014/main" id="{63BF756E-0DAB-1B42-96C1-E87F41A3C2F7}"/>
               </a:ext>
             </a:extLst>
@@ -6341,13 +6474,13 @@
         </p:nvSpPr>
         <p:spPr>
           <a:xfrm>
-            <a:off x="1103313" y="2052918"/>
+            <a:off x="839153" y="1639745"/>
             <a:ext cx="4992688" cy="4195481"/>
           </a:xfrm>
         </p:spPr>
         <p:txBody>
           <a:bodyPr>
-            <a:normAutofit/>
+            <a:normAutofit fontScale="92500" lnSpcReduction="10000"/>
           </a:bodyPr>
           <a:lstStyle/>
           <a:p>
@@ -6360,6 +6493,145 @@
               </a:rPr>
               <a:t>With the use of two new exception types </a:t>
             </a:r>
+            <a:endParaRPr lang="pt-PT" sz="3200" dirty="0">
+              <a:cs typeface="Calibri" panose="020F0502020204030204" pitchFamily="34" charset="0"/>
+            </a:endParaRPr>
+          </a:p>
+          <a:p>
+            <a:pPr marL="0" indent="0">
+              <a:buNone/>
+            </a:pPr>
+            <a:endParaRPr lang="pt-PT" sz="3200" dirty="0">
+              <a:cs typeface="Calibri" panose="020F0502020204030204" pitchFamily="34" charset="0"/>
+            </a:endParaRPr>
+          </a:p>
+          <a:p>
+            <a:pPr marL="0" indent="0">
+              <a:buNone/>
+            </a:pPr>
+            <a:r>
+              <a:rPr lang="pt-PT" sz="1800" dirty="0">
+                <a:cs typeface="Calibri" panose="020F0502020204030204" pitchFamily="34" charset="0"/>
+              </a:rPr>
+              <a:t>These allow us to pass data specific to each type</a:t>
+            </a:r>
+          </a:p>
+          <a:p>
+            <a:pPr>
+              <a:buFont typeface="Wingdings" panose="05000000000000000000" pitchFamily="2" charset="2"/>
+              <a:buChar char="Ø"/>
+            </a:pPr>
+            <a:r>
+              <a:rPr lang="pt-PT" sz="1800" dirty="0">
+                <a:cs typeface="Calibri" panose="020F0502020204030204" pitchFamily="34" charset="0"/>
+              </a:rPr>
+              <a:t>ReturnException </a:t>
+            </a:r>
+          </a:p>
+          <a:p>
+            <a:pPr lvl="1">
+              <a:buFont typeface="Wingdings" panose="05000000000000000000" pitchFamily="2" charset="2"/>
+              <a:buChar char="Ø"/>
+            </a:pPr>
+            <a:r>
+              <a:rPr lang="pt-PT" sz="1600" dirty="0">
+                <a:cs typeface="Calibri" panose="020F0502020204030204" pitchFamily="34" charset="0"/>
+              </a:rPr>
+              <a:t>Thrown when a restart invocation ends</a:t>
+            </a:r>
+          </a:p>
+          <a:p>
+            <a:pPr lvl="1">
+              <a:buFont typeface="Wingdings" panose="05000000000000000000" pitchFamily="2" charset="2"/>
+              <a:buChar char="Ø"/>
+            </a:pPr>
+            <a:r>
+              <a:rPr lang="pt-PT" sz="1600" dirty="0">
+                <a:cs typeface="Calibri" panose="020F0502020204030204" pitchFamily="34" charset="0"/>
+              </a:rPr>
+              <a:t>Contains the return value of the restart function</a:t>
+            </a:r>
+          </a:p>
+          <a:p>
+            <a:pPr>
+              <a:buFont typeface="Wingdings" panose="05000000000000000000" pitchFamily="2" charset="2"/>
+              <a:buChar char="Ø"/>
+            </a:pPr>
+            <a:r>
+              <a:rPr lang="pt-PT" sz="1600" dirty="0">
+                <a:cs typeface="Calibri" panose="020F0502020204030204" pitchFamily="34" charset="0"/>
+              </a:rPr>
+              <a:t>NamedBlockReturnException</a:t>
+            </a:r>
+          </a:p>
+          <a:p>
+            <a:pPr lvl="1">
+              <a:buFont typeface="Wingdings" panose="05000000000000000000" pitchFamily="2" charset="2"/>
+              <a:buChar char="Ø"/>
+            </a:pPr>
+            <a:r>
+              <a:rPr lang="pt-PT" sz="1400" dirty="0">
+                <a:cs typeface="Calibri" panose="020F0502020204030204" pitchFamily="34" charset="0"/>
+              </a:rPr>
+              <a:t>Thrown by </a:t>
+            </a:r>
+            <a:r>
+              <a:rPr lang="pt-PT" sz="1400" b="1" dirty="0">
+                <a:cs typeface="Calibri" panose="020F0502020204030204" pitchFamily="34" charset="0"/>
+              </a:rPr>
+              <a:t>return_from </a:t>
+            </a:r>
+            <a:r>
+              <a:rPr lang="pt-PT" sz="1400" dirty="0">
+                <a:cs typeface="Calibri" panose="020F0502020204030204" pitchFamily="34" charset="0"/>
+              </a:rPr>
+              <a:t>function</a:t>
+            </a:r>
+          </a:p>
+          <a:p>
+            <a:pPr lvl="1">
+              <a:buFont typeface="Wingdings" panose="05000000000000000000" pitchFamily="2" charset="2"/>
+              <a:buChar char="Ø"/>
+            </a:pPr>
+            <a:r>
+              <a:rPr lang="pt-PT" sz="1400" dirty="0">
+                <a:cs typeface="Calibri" panose="020F0502020204030204" pitchFamily="34" charset="0"/>
+              </a:rPr>
+              <a:t>Used to exit from a named </a:t>
+            </a:r>
+            <a:r>
+              <a:rPr lang="pt-PT" sz="1400" b="1" dirty="0">
+                <a:cs typeface="Calibri" panose="020F0502020204030204" pitchFamily="34" charset="0"/>
+              </a:rPr>
+              <a:t>block</a:t>
+            </a:r>
+            <a:r>
+              <a:rPr lang="pt-PT" sz="1400" dirty="0">
+                <a:cs typeface="Calibri" panose="020F0502020204030204" pitchFamily="34" charset="0"/>
+              </a:rPr>
+              <a:t> </a:t>
+            </a:r>
+          </a:p>
+          <a:p>
+            <a:pPr lvl="1">
+              <a:buFont typeface="Wingdings" panose="05000000000000000000" pitchFamily="2" charset="2"/>
+              <a:buChar char="Ø"/>
+            </a:pPr>
+            <a:r>
+              <a:rPr lang="pt-PT" sz="1400" dirty="0">
+                <a:cs typeface="Calibri" panose="020F0502020204030204" pitchFamily="34" charset="0"/>
+              </a:rPr>
+              <a:t>May contain an optional value supplied on </a:t>
+            </a:r>
+            <a:r>
+              <a:rPr lang="pt-PT" sz="1400" b="1" dirty="0">
+                <a:cs typeface="Calibri" panose="020F0502020204030204" pitchFamily="34" charset="0"/>
+              </a:rPr>
+              <a:t>return_from</a:t>
+            </a:r>
+            <a:endParaRPr lang="en-PT" sz="1400" b="1" dirty="0">
+              <a:cs typeface="Calibri" panose="020F0502020204030204" pitchFamily="34" charset="0"/>
+            </a:endParaRPr>
           </a:p>
         </p:txBody>
       </p:sp>
@@ -6385,7 +6657,7 @@
         </p:blipFill>
         <p:spPr>
           <a:xfrm>
-            <a:off x="5435601" y="3674783"/>
+            <a:off x="5692987" y="4094981"/>
             <a:ext cx="6273800" cy="1435100"/>
           </a:xfrm>
           <a:prstGeom prst="rect">
@@ -6415,7 +6687,7 @@
         </p:blipFill>
         <p:spPr>
           <a:xfrm>
-            <a:off x="6096000" y="2052918"/>
+            <a:off x="6197601" y="1588520"/>
             <a:ext cx="4953000" cy="1130300"/>
           </a:xfrm>
           <a:prstGeom prst="rect">
@@ -6436,7 +6708,7 @@
 </p:sld>
 </file>
 
-<file path=ppt/slides/slide4.xml><?xml version="1.0" encoding="utf-8"?>
+<file path=ppt/slides/slide5.xml><?xml version="1.0" encoding="utf-8"?>
 <p:sld xmlns:a="http://schemas.openxmlformats.org/drawingml/2006/main" xmlns:r="http://schemas.openxmlformats.org/officeDocument/2006/relationships" xmlns:p="http://schemas.openxmlformats.org/presentationml/2006/main">
   <p:cSld>
     <p:spTree>
@@ -6458,7 +6730,7 @@
           <p:cNvPr id="2" name="Title 1">
             <a:extLst>
               <a:ext uri="{FF2B5EF4-FFF2-40B4-BE49-F238E27FC236}">
-                <a16:creationId xmlns:a16="http://schemas.microsoft.com/office/drawing/2014/main" id="{B82C10CD-EC27-D04C-A79E-29E1E3CCCD38}"/>
+                <a16:creationId xmlns:a16="http://schemas.microsoft.com/office/drawing/2014/main" id="{2308D85C-55DA-4987-9323-439EA47D2E0E}"/>
               </a:ext>
             </a:extLst>
           </p:cNvPr>
@@ -6475,11 +6747,8 @@
           <a:lstStyle/>
           <a:p>
             <a:r>
-              <a:rPr lang="en-PT" dirty="0">
-                <a:latin typeface="Calibri" panose="020F0502020204030204" pitchFamily="34" charset="0"/>
-                <a:cs typeface="Calibri" panose="020F0502020204030204" pitchFamily="34" charset="0"/>
-              </a:rPr>
-              <a:t>HOW?</a:t>
+              <a:rPr lang="pt-PT" dirty="0"/>
+              <a:t>Scope Problems</a:t>
             </a:r>
           </a:p>
         </p:txBody>
@@ -6489,7 +6758,7 @@
           <p:cNvPr id="3" name="Content Placeholder 2">
             <a:extLst>
               <a:ext uri="{FF2B5EF4-FFF2-40B4-BE49-F238E27FC236}">
-                <a16:creationId xmlns:a16="http://schemas.microsoft.com/office/drawing/2014/main" id="{299F3C48-D6E3-6E48-8FB0-A873BF656219}"/>
+                <a16:creationId xmlns:a16="http://schemas.microsoft.com/office/drawing/2014/main" id="{5674EDB9-75C5-4570-BBA0-1FA69A6AD0C2}"/>
               </a:ext>
             </a:extLst>
           </p:cNvPr>
@@ -6503,7 +6772,7 @@
         <p:spPr/>
         <p:txBody>
           <a:bodyPr>
-            <a:normAutofit/>
+            <a:normAutofit fontScale="92500" lnSpcReduction="10000"/>
           </a:bodyPr>
           <a:lstStyle/>
           <a:p>
@@ -6511,52 +6780,78 @@
               <a:buNone/>
             </a:pPr>
             <a:r>
-              <a:rPr lang="en-PT" sz="3200" dirty="0"/>
-              <a:t>ReturnException is used by restarts to return the value</a:t>
+              <a:rPr lang="pt-PT" dirty="0"/>
+              <a:t>Both handler_bind and restart_bind forms are meant to only bind the supplied values on the scope that is provided by Julia’s do-end forms.</a:t>
             </a:r>
           </a:p>
           <a:p>
             <a:pPr marL="0" indent="0">
               <a:buNone/>
             </a:pPr>
-            <a:endParaRPr lang="en-PT" sz="3200" dirty="0"/>
+            <a:endParaRPr lang="pt-PT" dirty="0"/>
           </a:p>
           <a:p>
             <a:pPr marL="0" indent="0">
               <a:buNone/>
             </a:pPr>
             <a:r>
-              <a:rPr lang="en-PT" sz="3200" dirty="0"/>
-              <a:t>NamedBlockReturnException </a:t>
-            </a:r>
-            <a:r>
-              <a:rPr lang="en-GB" sz="3200" dirty="0"/>
-              <a:t>is sent by the </a:t>
-            </a:r>
-            <a:r>
-              <a:rPr lang="en-GB" sz="3200" dirty="0" err="1"/>
-              <a:t>return_from</a:t>
-            </a:r>
-            <a:r>
-              <a:rPr lang="en-GB" sz="3200" dirty="0"/>
-              <a:t> and contains the </a:t>
-            </a:r>
-            <a:r>
-              <a:rPr lang="en-GB" sz="3200" dirty="0" err="1"/>
-              <a:t>block_name</a:t>
-            </a:r>
-            <a:r>
-              <a:rPr lang="en-GB" sz="3200" dirty="0"/>
-              <a:t> to return from and the return value</a:t>
-            </a:r>
-            <a:endParaRPr lang="en-PT" sz="3200" dirty="0"/>
+              <a:rPr lang="pt-PT" dirty="0"/>
+              <a:t>We store those values in an appropriate array (one for handlers, one for restarts) and dynamically add and remove on entry and exit of scope.</a:t>
+            </a:r>
+          </a:p>
+          <a:p>
+            <a:pPr marL="0" indent="0">
+              <a:buNone/>
+            </a:pPr>
+            <a:endParaRPr lang="pt-PT" dirty="0"/>
+          </a:p>
+          <a:p>
+            <a:pPr marL="0" indent="0">
+              <a:buNone/>
+            </a:pPr>
+            <a:r>
+              <a:rPr lang="pt-PT" dirty="0"/>
+              <a:t>This is done by wrapping the handler_bind and restart_bind on a </a:t>
+            </a:r>
+            <a:r>
+              <a:rPr lang="pt-PT" b="1" dirty="0"/>
+              <a:t>block </a:t>
+            </a:r>
+            <a:r>
+              <a:rPr lang="pt-PT" dirty="0"/>
+              <a:t>function. </a:t>
+            </a:r>
+          </a:p>
+          <a:p>
+            <a:pPr marL="0" indent="0">
+              <a:buNone/>
+            </a:pPr>
+            <a:r>
+              <a:rPr lang="pt-PT" dirty="0"/>
+              <a:t>Then, by mapping each handler/restart to the current block name and adding to the array, on exit of the bind functions we just need to remove the handlers/restarts that are bound to the block name.</a:t>
+            </a:r>
+          </a:p>
+          <a:p>
+            <a:pPr marL="0" indent="0">
+              <a:buNone/>
+            </a:pPr>
+            <a:endParaRPr lang="pt-PT" dirty="0"/>
+          </a:p>
+          <a:p>
+            <a:pPr marL="0" indent="0">
+              <a:buNone/>
+            </a:pPr>
+            <a:r>
+              <a:rPr lang="pt-PT" dirty="0"/>
+              <a:t>A try-finally is useful to always remove the handlers no matter what happens.</a:t>
+            </a:r>
           </a:p>
         </p:txBody>
       </p:sp>
     </p:spTree>
     <p:extLst>
       <p:ext uri="{BB962C8B-B14F-4D97-AF65-F5344CB8AC3E}">
-        <p14:creationId xmlns:p14="http://schemas.microsoft.com/office/powerpoint/2010/main" val="1893415443"/>
+        <p14:creationId xmlns:p14="http://schemas.microsoft.com/office/powerpoint/2010/main" val="2765159185"/>
       </p:ext>
     </p:extLst>
   </p:cSld>

</xml_diff>